<commit_message>
updated Docker ppt with Networking concepts
</commit_message>
<xml_diff>
--- a/Dockers/Docker_Tutorial.pptx
+++ b/Dockers/Docker_Tutorial.pptx
@@ -5,7 +5,7 @@
     <p:sldMasterId id="2147483648" r:id="rId1"/>
   </p:sldMasterIdLst>
   <p:notesMasterIdLst>
-    <p:notesMasterId r:id="rId12"/>
+    <p:notesMasterId r:id="rId14"/>
   </p:notesMasterIdLst>
   <p:sldIdLst>
     <p:sldId id="256" r:id="rId2"/>
@@ -17,7 +17,9 @@
     <p:sldId id="265" r:id="rId8"/>
     <p:sldId id="266" r:id="rId9"/>
     <p:sldId id="261" r:id="rId10"/>
-    <p:sldId id="262" r:id="rId11"/>
+    <p:sldId id="267" r:id="rId11"/>
+    <p:sldId id="268" r:id="rId12"/>
+    <p:sldId id="262" r:id="rId13"/>
   </p:sldIdLst>
   <p:sldSz cx="9144000" cy="6858000" type="screen4x3"/>
   <p:notesSz cx="6858000" cy="9144000"/>
@@ -201,7 +203,7 @@
           <a:p>
             <a:fld id="{4C32271A-8C73-4D86-BAB6-7E0DDB3CE906}" type="datetimeFigureOut">
               <a:rPr lang="en-US" smtClean="0"/>
-              <a:t>7/4/2017</a:t>
+              <a:t>7/7/2017</a:t>
             </a:fld>
             <a:endParaRPr lang="en-US"/>
           </a:p>
@@ -591,6 +593,130 @@
 </p:notes>
 </file>
 
+<file path=ppt/notesSlides/notesSlide2.xml><?xml version="1.0" encoding="utf-8"?>
+<p:notes xmlns:a="http://schemas.openxmlformats.org/drawingml/2006/main" xmlns:r="http://schemas.openxmlformats.org/officeDocument/2006/relationships" xmlns:p="http://schemas.openxmlformats.org/presentationml/2006/main">
+  <p:cSld>
+    <p:spTree>
+      <p:nvGrpSpPr>
+        <p:cNvPr id="1" name=""/>
+        <p:cNvGrpSpPr/>
+        <p:nvPr/>
+      </p:nvGrpSpPr>
+      <p:grpSpPr>
+        <a:xfrm>
+          <a:off x="0" y="0"/>
+          <a:ext cx="0" cy="0"/>
+          <a:chOff x="0" y="0"/>
+          <a:chExt cx="0" cy="0"/>
+        </a:xfrm>
+      </p:grpSpPr>
+      <p:sp>
+        <p:nvSpPr>
+          <p:cNvPr id="2" name="Slide Image Placeholder 1"/>
+          <p:cNvSpPr>
+            <a:spLocks noGrp="1" noRot="1" noChangeAspect="1"/>
+          </p:cNvSpPr>
+          <p:nvPr>
+            <p:ph type="sldImg"/>
+          </p:nvPr>
+        </p:nvSpPr>
+        <p:spPr/>
+      </p:sp>
+      <p:sp>
+        <p:nvSpPr>
+          <p:cNvPr id="3" name="Notes Placeholder 2"/>
+          <p:cNvSpPr>
+            <a:spLocks noGrp="1"/>
+          </p:cNvSpPr>
+          <p:nvPr>
+            <p:ph type="body" idx="1"/>
+          </p:nvPr>
+        </p:nvSpPr>
+        <p:spPr/>
+        <p:txBody>
+          <a:bodyPr/>
+          <a:lstStyle/>
+          <a:p>
+            <a:r>
+              <a:rPr lang="en-US" dirty="0" err="1" smtClean="0"/>
+              <a:t>Adejonge</a:t>
+            </a:r>
+            <a:r>
+              <a:rPr lang="en-US" dirty="0" smtClean="0"/>
+              <a:t>/</a:t>
+            </a:r>
+            <a:r>
+              <a:rPr lang="en-US" dirty="0" err="1" smtClean="0"/>
+              <a:t>helloworld</a:t>
+            </a:r>
+            <a:r>
+              <a:rPr lang="en-US" dirty="0" smtClean="0"/>
+              <a:t> – it</a:t>
+            </a:r>
+            <a:r>
+              <a:rPr lang="en-US" baseline="0" dirty="0" smtClean="0"/>
+              <a:t> is a </a:t>
+            </a:r>
+            <a:r>
+              <a:rPr lang="en-US" baseline="0" dirty="0" err="1" smtClean="0"/>
+              <a:t>selfcontained</a:t>
+            </a:r>
+            <a:r>
+              <a:rPr lang="en-US" baseline="0" dirty="0" smtClean="0"/>
+              <a:t> webserver which servers </a:t>
+            </a:r>
+            <a:r>
+              <a:rPr lang="en-US" baseline="0" dirty="0" err="1" smtClean="0"/>
+              <a:t>onepage</a:t>
+            </a:r>
+            <a:r>
+              <a:rPr lang="en-US" baseline="0" dirty="0" smtClean="0"/>
+              <a:t> on port 8080</a:t>
+            </a:r>
+            <a:r>
+              <a:rPr lang="en-US" dirty="0" smtClean="0"/>
+              <a:t> </a:t>
+            </a:r>
+            <a:endParaRPr lang="en-US" dirty="0"/>
+          </a:p>
+        </p:txBody>
+      </p:sp>
+      <p:sp>
+        <p:nvSpPr>
+          <p:cNvPr id="4" name="Slide Number Placeholder 3"/>
+          <p:cNvSpPr>
+            <a:spLocks noGrp="1"/>
+          </p:cNvSpPr>
+          <p:nvPr>
+            <p:ph type="sldNum" sz="quarter" idx="10"/>
+          </p:nvPr>
+        </p:nvSpPr>
+        <p:spPr/>
+        <p:txBody>
+          <a:bodyPr/>
+          <a:lstStyle/>
+          <a:p>
+            <a:fld id="{1D92E1DA-36CC-448F-BF8E-DCA58C2CD557}" type="slidenum">
+              <a:rPr lang="en-US" smtClean="0"/>
+              <a:t>9</a:t>
+            </a:fld>
+            <a:endParaRPr lang="en-US"/>
+          </a:p>
+        </p:txBody>
+      </p:sp>
+    </p:spTree>
+    <p:extLst>
+      <p:ext uri="{BB962C8B-B14F-4D97-AF65-F5344CB8AC3E}">
+        <p14:creationId xmlns:p14="http://schemas.microsoft.com/office/powerpoint/2010/main" val="3013578857"/>
+      </p:ext>
+    </p:extLst>
+  </p:cSld>
+  <p:clrMapOvr>
+    <a:masterClrMapping/>
+  </p:clrMapOvr>
+</p:notes>
+</file>
+
 <file path=ppt/slideLayouts/slideLayout1.xml><?xml version="1.0" encoding="utf-8"?>
 <p:sldLayout xmlns:a="http://schemas.openxmlformats.org/drawingml/2006/main" xmlns:r="http://schemas.openxmlformats.org/officeDocument/2006/relationships" xmlns:p="http://schemas.openxmlformats.org/presentationml/2006/main" type="title" preserve="1">
   <p:cSld name="Title Slide">
@@ -772,7 +898,7 @@
           <a:p>
             <a:fld id="{D8D5993A-BDE8-4DA1-A758-DF79A4A926A0}" type="datetimeFigureOut">
               <a:rPr lang="en-US" smtClean="0"/>
-              <a:t>7/4/2017</a:t>
+              <a:t>7/7/2017</a:t>
             </a:fld>
             <a:endParaRPr lang="en-US"/>
           </a:p>
@@ -942,7 +1068,7 @@
           <a:p>
             <a:fld id="{D8D5993A-BDE8-4DA1-A758-DF79A4A926A0}" type="datetimeFigureOut">
               <a:rPr lang="en-US" smtClean="0"/>
-              <a:t>7/4/2017</a:t>
+              <a:t>7/7/2017</a:t>
             </a:fld>
             <a:endParaRPr lang="en-US"/>
           </a:p>
@@ -1122,7 +1248,7 @@
           <a:p>
             <a:fld id="{D8D5993A-BDE8-4DA1-A758-DF79A4A926A0}" type="datetimeFigureOut">
               <a:rPr lang="en-US" smtClean="0"/>
-              <a:t>7/4/2017</a:t>
+              <a:t>7/7/2017</a:t>
             </a:fld>
             <a:endParaRPr lang="en-US"/>
           </a:p>
@@ -1292,7 +1418,7 @@
           <a:p>
             <a:fld id="{D8D5993A-BDE8-4DA1-A758-DF79A4A926A0}" type="datetimeFigureOut">
               <a:rPr lang="en-US" smtClean="0"/>
-              <a:t>7/4/2017</a:t>
+              <a:t>7/7/2017</a:t>
             </a:fld>
             <a:endParaRPr lang="en-US"/>
           </a:p>
@@ -1538,7 +1664,7 @@
           <a:p>
             <a:fld id="{D8D5993A-BDE8-4DA1-A758-DF79A4A926A0}" type="datetimeFigureOut">
               <a:rPr lang="en-US" smtClean="0"/>
-              <a:t>7/4/2017</a:t>
+              <a:t>7/7/2017</a:t>
             </a:fld>
             <a:endParaRPr lang="en-US"/>
           </a:p>
@@ -1826,7 +1952,7 @@
           <a:p>
             <a:fld id="{D8D5993A-BDE8-4DA1-A758-DF79A4A926A0}" type="datetimeFigureOut">
               <a:rPr lang="en-US" smtClean="0"/>
-              <a:t>7/4/2017</a:t>
+              <a:t>7/7/2017</a:t>
             </a:fld>
             <a:endParaRPr lang="en-US"/>
           </a:p>
@@ -2248,7 +2374,7 @@
           <a:p>
             <a:fld id="{D8D5993A-BDE8-4DA1-A758-DF79A4A926A0}" type="datetimeFigureOut">
               <a:rPr lang="en-US" smtClean="0"/>
-              <a:t>7/4/2017</a:t>
+              <a:t>7/7/2017</a:t>
             </a:fld>
             <a:endParaRPr lang="en-US"/>
           </a:p>
@@ -2366,7 +2492,7 @@
           <a:p>
             <a:fld id="{D8D5993A-BDE8-4DA1-A758-DF79A4A926A0}" type="datetimeFigureOut">
               <a:rPr lang="en-US" smtClean="0"/>
-              <a:t>7/4/2017</a:t>
+              <a:t>7/7/2017</a:t>
             </a:fld>
             <a:endParaRPr lang="en-US"/>
           </a:p>
@@ -2461,7 +2587,7 @@
           <a:p>
             <a:fld id="{D8D5993A-BDE8-4DA1-A758-DF79A4A926A0}" type="datetimeFigureOut">
               <a:rPr lang="en-US" smtClean="0"/>
-              <a:t>7/4/2017</a:t>
+              <a:t>7/7/2017</a:t>
             </a:fld>
             <a:endParaRPr lang="en-US"/>
           </a:p>
@@ -2738,7 +2864,7 @@
           <a:p>
             <a:fld id="{D8D5993A-BDE8-4DA1-A758-DF79A4A926A0}" type="datetimeFigureOut">
               <a:rPr lang="en-US" smtClean="0"/>
-              <a:t>7/4/2017</a:t>
+              <a:t>7/7/2017</a:t>
             </a:fld>
             <a:endParaRPr lang="en-US"/>
           </a:p>
@@ -2991,7 +3117,7 @@
           <a:p>
             <a:fld id="{D8D5993A-BDE8-4DA1-A758-DF79A4A926A0}" type="datetimeFigureOut">
               <a:rPr lang="en-US" smtClean="0"/>
-              <a:t>7/4/2017</a:t>
+              <a:t>7/7/2017</a:t>
             </a:fld>
             <a:endParaRPr lang="en-US"/>
           </a:p>
@@ -3204,7 +3330,7 @@
           <a:p>
             <a:fld id="{D8D5993A-BDE8-4DA1-A758-DF79A4A926A0}" type="datetimeFigureOut">
               <a:rPr lang="en-US" smtClean="0"/>
-              <a:t>7/4/2017</a:t>
+              <a:t>7/7/2017</a:t>
             </a:fld>
             <a:endParaRPr lang="en-US"/>
           </a:p>
@@ -3699,6 +3825,1094 @@
           <a:chExt cx="0" cy="0"/>
         </a:xfrm>
       </p:grpSpPr>
+      <p:sp>
+        <p:nvSpPr>
+          <p:cNvPr id="2" name="TextBox 1"/>
+          <p:cNvSpPr txBox="1"/>
+          <p:nvPr/>
+        </p:nvSpPr>
+        <p:spPr>
+          <a:xfrm>
+            <a:off x="2022377" y="152400"/>
+            <a:ext cx="5613017" cy="646331"/>
+          </a:xfrm>
+          <a:prstGeom prst="rect">
+            <a:avLst/>
+          </a:prstGeom>
+          <a:noFill/>
+        </p:spPr>
+        <p:txBody>
+          <a:bodyPr wrap="square" rtlCol="0">
+            <a:spAutoFit/>
+          </a:bodyPr>
+          <a:lstStyle/>
+          <a:p>
+            <a:pPr algn="ctr"/>
+            <a:r>
+              <a:rPr lang="en-US" sz="3600" dirty="0" smtClean="0"/>
+              <a:t>NETWORKING IN DOCKER</a:t>
+            </a:r>
+            <a:endParaRPr lang="en-US" sz="3600" dirty="0"/>
+          </a:p>
+        </p:txBody>
+      </p:sp>
+      <p:sp>
+        <p:nvSpPr>
+          <p:cNvPr id="3" name="TextBox 2"/>
+          <p:cNvSpPr txBox="1"/>
+          <p:nvPr/>
+        </p:nvSpPr>
+        <p:spPr>
+          <a:xfrm>
+            <a:off x="304800" y="793313"/>
+            <a:ext cx="8610600" cy="6217087"/>
+          </a:xfrm>
+          <a:prstGeom prst="rect">
+            <a:avLst/>
+          </a:prstGeom>
+          <a:noFill/>
+        </p:spPr>
+        <p:txBody>
+          <a:bodyPr wrap="square" rtlCol="0">
+            <a:spAutoFit/>
+          </a:bodyPr>
+          <a:lstStyle/>
+          <a:p>
+            <a:r>
+              <a:rPr lang="en-US" dirty="0" smtClean="0"/>
+              <a:t>Hence the </a:t>
+            </a:r>
+            <a:r>
+              <a:rPr lang="en-US" b="1" dirty="0" smtClean="0"/>
+              <a:t>Virtual Interface (</a:t>
+            </a:r>
+            <a:r>
+              <a:rPr lang="en-US" b="1" dirty="0"/>
+              <a:t>Docker0:172.16.0.1</a:t>
+            </a:r>
+            <a:r>
+              <a:rPr lang="en-US" b="1" dirty="0" smtClean="0"/>
+              <a:t>) </a:t>
+            </a:r>
+            <a:r>
+              <a:rPr lang="en-US" dirty="0" smtClean="0"/>
+              <a:t>is created when you have a </a:t>
+            </a:r>
+            <a:r>
+              <a:rPr lang="en-US" dirty="0" err="1" smtClean="0"/>
+              <a:t>docker</a:t>
+            </a:r>
+            <a:r>
+              <a:rPr lang="en-US" dirty="0" smtClean="0"/>
+              <a:t> installed and then a </a:t>
+            </a:r>
+            <a:r>
+              <a:rPr lang="en-US" b="1" dirty="0" smtClean="0"/>
+              <a:t>Bridge Networked (Virtual </a:t>
+            </a:r>
+            <a:r>
+              <a:rPr lang="en-US" b="1" dirty="0" err="1" smtClean="0"/>
+              <a:t>EtherNet</a:t>
+            </a:r>
+            <a:r>
+              <a:rPr lang="en-US" b="1" dirty="0" smtClean="0"/>
+              <a:t> Port - </a:t>
+            </a:r>
+            <a:r>
+              <a:rPr lang="en-US" b="1" dirty="0" err="1"/>
+              <a:t>VetnXXX</a:t>
+            </a:r>
+            <a:r>
+              <a:rPr lang="en-US" b="1" dirty="0" smtClean="0"/>
+              <a:t>)</a:t>
+            </a:r>
+            <a:r>
+              <a:rPr lang="en-US" dirty="0" smtClean="0"/>
+              <a:t> is created for every running container and an IP Address is allocated.</a:t>
+            </a:r>
+          </a:p>
+          <a:p>
+            <a:r>
+              <a:rPr lang="en-US" dirty="0" smtClean="0"/>
+              <a:t>Finding the IP:</a:t>
+            </a:r>
+          </a:p>
+          <a:p>
+            <a:r>
+              <a:rPr lang="en-US" b="1" dirty="0" smtClean="0">
+                <a:solidFill>
+                  <a:srgbClr val="C00000"/>
+                </a:solidFill>
+              </a:rPr>
+              <a:t>Step 1: </a:t>
+            </a:r>
+            <a:r>
+              <a:rPr lang="en-US" dirty="0" smtClean="0"/>
+              <a:t>Check your host with </a:t>
+            </a:r>
+          </a:p>
+          <a:p>
+            <a:r>
+              <a:rPr lang="en-US" b="1" i="1" dirty="0" smtClean="0"/>
+              <a:t>$ </a:t>
+            </a:r>
+            <a:r>
+              <a:rPr lang="en-US" b="1" i="1" dirty="0" err="1" smtClean="0"/>
+              <a:t>ifconfig</a:t>
+            </a:r>
+            <a:r>
+              <a:rPr lang="en-US" b="1" i="1" dirty="0" smtClean="0"/>
+              <a:t>   </a:t>
+            </a:r>
+          </a:p>
+          <a:p>
+            <a:r>
+              <a:rPr lang="en-US" dirty="0" smtClean="0"/>
+              <a:t>You would find an eht0 and docker0 but not </a:t>
+            </a:r>
+            <a:r>
+              <a:rPr lang="en-US" b="1" dirty="0" err="1"/>
+              <a:t>VetnXXX</a:t>
+            </a:r>
+            <a:r>
+              <a:rPr lang="en-US" dirty="0" smtClean="0"/>
+              <a:t>.(Note: without any running container.)</a:t>
+            </a:r>
+          </a:p>
+          <a:p>
+            <a:r>
+              <a:rPr lang="en-US" b="1" dirty="0" smtClean="0">
+                <a:solidFill>
+                  <a:srgbClr val="C00000"/>
+                </a:solidFill>
+              </a:rPr>
+              <a:t>Step 2: </a:t>
+            </a:r>
+            <a:r>
+              <a:rPr lang="en-US" dirty="0" smtClean="0"/>
+              <a:t>Run this container in daemon mode.</a:t>
+            </a:r>
+          </a:p>
+          <a:p>
+            <a:r>
+              <a:rPr lang="en-US" b="1" i="1" dirty="0"/>
+              <a:t>$ </a:t>
+            </a:r>
+            <a:r>
+              <a:rPr lang="en-US" b="1" i="1" dirty="0" err="1"/>
+              <a:t>sudo</a:t>
+            </a:r>
+            <a:r>
+              <a:rPr lang="en-US" b="1" i="1" dirty="0"/>
+              <a:t> </a:t>
+            </a:r>
+            <a:r>
+              <a:rPr lang="en-US" b="1" i="1" dirty="0" err="1" smtClean="0"/>
+              <a:t>docker</a:t>
+            </a:r>
+            <a:r>
+              <a:rPr lang="en-US" b="1" i="1" dirty="0" smtClean="0"/>
+              <a:t> run –d </a:t>
+            </a:r>
+            <a:r>
+              <a:rPr lang="en-US" b="1" i="1" dirty="0" err="1" smtClean="0"/>
+              <a:t>adejonge</a:t>
+            </a:r>
+            <a:r>
+              <a:rPr lang="en-US" b="1" i="1" dirty="0" smtClean="0"/>
+              <a:t>/</a:t>
+            </a:r>
+            <a:r>
+              <a:rPr lang="en-US" b="1" i="1" dirty="0" err="1" smtClean="0"/>
+              <a:t>helloworld</a:t>
+            </a:r>
+            <a:r>
+              <a:rPr lang="en-US" b="1" i="1" dirty="0" smtClean="0"/>
+              <a:t> (</a:t>
+            </a:r>
+            <a:r>
+              <a:rPr lang="en-US" dirty="0"/>
+              <a:t>it is a </a:t>
+            </a:r>
+            <a:r>
+              <a:rPr lang="en-US" dirty="0" err="1"/>
+              <a:t>selfcontained</a:t>
+            </a:r>
+            <a:r>
+              <a:rPr lang="en-US" dirty="0"/>
+              <a:t> webserver which servers </a:t>
+            </a:r>
+            <a:r>
+              <a:rPr lang="en-US" dirty="0" smtClean="0"/>
+              <a:t>one page </a:t>
+            </a:r>
+            <a:r>
+              <a:rPr lang="en-US" dirty="0"/>
+              <a:t>on port </a:t>
+            </a:r>
+            <a:r>
+              <a:rPr lang="en-US" dirty="0" smtClean="0"/>
+              <a:t>8080 but need to know the IP address of this container</a:t>
+            </a:r>
+            <a:r>
+              <a:rPr lang="en-US" b="1" i="1" dirty="0" smtClean="0"/>
+              <a:t>)</a:t>
+            </a:r>
+          </a:p>
+          <a:p>
+            <a:r>
+              <a:rPr lang="en-US" b="1" dirty="0" smtClean="0">
+                <a:solidFill>
+                  <a:srgbClr val="C00000"/>
+                </a:solidFill>
+              </a:rPr>
+              <a:t>Step 3 </a:t>
+            </a:r>
+            <a:r>
+              <a:rPr lang="en-US" b="1" dirty="0">
+                <a:solidFill>
+                  <a:srgbClr val="C00000"/>
+                </a:solidFill>
+              </a:rPr>
+              <a:t>: </a:t>
+            </a:r>
+            <a:r>
+              <a:rPr lang="en-US" dirty="0"/>
+              <a:t>Finding the </a:t>
+            </a:r>
+            <a:r>
+              <a:rPr lang="en-US" dirty="0" smtClean="0"/>
+              <a:t>IP of this </a:t>
+            </a:r>
+            <a:r>
+              <a:rPr lang="en-US" dirty="0" err="1" smtClean="0"/>
+              <a:t>contianer</a:t>
+            </a:r>
+            <a:r>
+              <a:rPr lang="en-US" dirty="0" smtClean="0"/>
+              <a:t>.</a:t>
+            </a:r>
+            <a:endParaRPr lang="en-US" b="1" i="1" dirty="0"/>
+          </a:p>
+          <a:p>
+            <a:r>
+              <a:rPr lang="en-US" b="1" i="1" dirty="0" smtClean="0"/>
+              <a:t>$ </a:t>
+            </a:r>
+            <a:r>
+              <a:rPr lang="en-US" b="1" i="1" dirty="0" err="1"/>
+              <a:t>sudo</a:t>
+            </a:r>
+            <a:r>
+              <a:rPr lang="en-US" b="1" i="1" dirty="0"/>
+              <a:t> </a:t>
+            </a:r>
+            <a:r>
+              <a:rPr lang="en-US" b="1" i="1" dirty="0" err="1"/>
+              <a:t>docker</a:t>
+            </a:r>
+            <a:r>
+              <a:rPr lang="en-US" b="1" i="1" dirty="0"/>
+              <a:t> </a:t>
+            </a:r>
+            <a:r>
+              <a:rPr lang="en-US" b="1" i="1" dirty="0" smtClean="0"/>
+              <a:t>inspect </a:t>
+            </a:r>
+            <a:r>
+              <a:rPr lang="en-US" b="1" i="1" dirty="0"/>
+              <a:t>&lt;</a:t>
+            </a:r>
+            <a:r>
+              <a:rPr lang="en-US" b="1" i="1" dirty="0" err="1"/>
+              <a:t>Cont.Name</a:t>
+            </a:r>
+            <a:r>
+              <a:rPr lang="en-US" b="1" i="1" dirty="0"/>
+              <a:t> or Cont.ID</a:t>
+            </a:r>
+            <a:r>
+              <a:rPr lang="en-US" b="1" i="1" dirty="0" smtClean="0"/>
+              <a:t>&gt;</a:t>
+            </a:r>
+            <a:r>
+              <a:rPr lang="en-US" dirty="0" smtClean="0"/>
+              <a:t> </a:t>
+            </a:r>
+            <a:r>
+              <a:rPr lang="en-US" b="1" i="1" dirty="0" smtClean="0"/>
+              <a:t>(“</a:t>
+            </a:r>
+            <a:r>
+              <a:rPr lang="en-US" b="1" i="1" dirty="0"/>
+              <a:t>check for the </a:t>
+            </a:r>
+            <a:r>
+              <a:rPr lang="en-US" b="1" i="1" dirty="0" smtClean="0"/>
+              <a:t>container information”)</a:t>
+            </a:r>
+            <a:endParaRPr lang="en-US" b="1" i="1" dirty="0"/>
+          </a:p>
+          <a:p>
+            <a:r>
+              <a:rPr lang="en-US" b="1" i="1" dirty="0"/>
+              <a:t>$ </a:t>
+            </a:r>
+            <a:r>
+              <a:rPr lang="en-US" b="1" i="1" dirty="0" err="1"/>
+              <a:t>sudo</a:t>
+            </a:r>
+            <a:r>
+              <a:rPr lang="en-US" b="1" i="1" dirty="0"/>
+              <a:t> </a:t>
+            </a:r>
+            <a:r>
+              <a:rPr lang="en-US" b="1" i="1" dirty="0" err="1"/>
+              <a:t>docker</a:t>
+            </a:r>
+            <a:r>
+              <a:rPr lang="en-US" b="1" i="1" dirty="0"/>
+              <a:t> inspect &lt;</a:t>
+            </a:r>
+            <a:r>
+              <a:rPr lang="en-US" b="1" i="1" dirty="0" err="1"/>
+              <a:t>Cont.Name</a:t>
+            </a:r>
+            <a:r>
+              <a:rPr lang="en-US" b="1" i="1" dirty="0"/>
+              <a:t> or Cont.ID&gt;</a:t>
+            </a:r>
+            <a:r>
+              <a:rPr lang="en-US" dirty="0"/>
+              <a:t> </a:t>
+            </a:r>
+            <a:r>
+              <a:rPr lang="en-US" dirty="0" smtClean="0"/>
+              <a:t>| grep IP</a:t>
+            </a:r>
+          </a:p>
+          <a:p>
+            <a:r>
+              <a:rPr lang="en-US" dirty="0" smtClean="0"/>
+              <a:t>Exactly here check for </a:t>
+            </a:r>
+          </a:p>
+          <a:p>
+            <a:r>
+              <a:rPr lang="en-US" b="1" i="1" dirty="0"/>
+              <a:t>$ </a:t>
+            </a:r>
+            <a:r>
+              <a:rPr lang="en-US" b="1" i="1" dirty="0" err="1"/>
+              <a:t>ifconfig</a:t>
+            </a:r>
+            <a:r>
+              <a:rPr lang="en-US" b="1" i="1" dirty="0"/>
+              <a:t>   </a:t>
+            </a:r>
+          </a:p>
+          <a:p>
+            <a:r>
+              <a:rPr lang="en-US" dirty="0"/>
+              <a:t>You would find an eht0 and docker0 but </a:t>
+            </a:r>
+            <a:r>
+              <a:rPr lang="en-US" dirty="0" smtClean="0"/>
+              <a:t>and </a:t>
+            </a:r>
+            <a:r>
+              <a:rPr lang="en-US" b="1" dirty="0" err="1" smtClean="0"/>
+              <a:t>VetnXXX</a:t>
+            </a:r>
+            <a:r>
+              <a:rPr lang="en-US" b="1" dirty="0" smtClean="0"/>
+              <a:t>. This is the </a:t>
+            </a:r>
+            <a:r>
+              <a:rPr lang="en-US" b="1" dirty="0"/>
+              <a:t>Bridge Networked </a:t>
+            </a:r>
+            <a:r>
+              <a:rPr lang="en-US" b="1" dirty="0" smtClean="0"/>
+              <a:t>Virtual </a:t>
+            </a:r>
+            <a:r>
+              <a:rPr lang="en-US" b="1" dirty="0" err="1"/>
+              <a:t>EtherNet</a:t>
+            </a:r>
+            <a:r>
+              <a:rPr lang="en-US" b="1" dirty="0"/>
+              <a:t> </a:t>
+            </a:r>
+            <a:r>
+              <a:rPr lang="en-US" b="1" dirty="0" smtClean="0"/>
+              <a:t>Port that  exposes IP </a:t>
+            </a:r>
+            <a:r>
+              <a:rPr lang="en-US" b="1" dirty="0" err="1" smtClean="0"/>
+              <a:t>fo</a:t>
+            </a:r>
+            <a:r>
+              <a:rPr lang="en-US" b="1" dirty="0" smtClean="0"/>
+              <a:t> the container to rest of the Network.</a:t>
+            </a:r>
+          </a:p>
+          <a:p>
+            <a:pPr algn="ctr"/>
+            <a:r>
+              <a:rPr lang="en-US" b="1" dirty="0" smtClean="0">
+                <a:solidFill>
+                  <a:srgbClr val="C00000"/>
+                </a:solidFill>
+              </a:rPr>
+              <a:t>Step 4: </a:t>
+            </a:r>
+          </a:p>
+          <a:p>
+            <a:pPr algn="ctr"/>
+            <a:r>
+              <a:rPr lang="en-US" sz="2800" b="1" dirty="0" smtClean="0"/>
+              <a:t>GOTO BROWSER and type : www.&lt;Container IP </a:t>
+            </a:r>
+            <a:r>
+              <a:rPr lang="en-US" sz="2800" b="1" dirty="0" err="1" smtClean="0"/>
+              <a:t>Adderss</a:t>
+            </a:r>
+            <a:r>
+              <a:rPr lang="en-US" sz="2800" b="1" dirty="0" smtClean="0"/>
+              <a:t>&gt;: 8080</a:t>
+            </a:r>
+            <a:endParaRPr lang="en-US" sz="2800" dirty="0"/>
+          </a:p>
+        </p:txBody>
+      </p:sp>
+    </p:spTree>
+    <p:extLst>
+      <p:ext uri="{BB962C8B-B14F-4D97-AF65-F5344CB8AC3E}">
+        <p14:creationId xmlns:p14="http://schemas.microsoft.com/office/powerpoint/2010/main" val="716975835"/>
+      </p:ext>
+    </p:extLst>
+  </p:cSld>
+  <p:clrMapOvr>
+    <a:masterClrMapping/>
+  </p:clrMapOvr>
+  <p:timing>
+    <p:tnLst>
+      <p:par>
+        <p:cTn id="1" dur="indefinite" restart="never" nodeType="tmRoot"/>
+      </p:par>
+    </p:tnLst>
+  </p:timing>
+</p:sld>
+</file>
+
+<file path=ppt/slides/slide11.xml><?xml version="1.0" encoding="utf-8"?>
+<p:sld xmlns:a="http://schemas.openxmlformats.org/drawingml/2006/main" xmlns:r="http://schemas.openxmlformats.org/officeDocument/2006/relationships" xmlns:p="http://schemas.openxmlformats.org/presentationml/2006/main">
+  <p:cSld>
+    <p:spTree>
+      <p:nvGrpSpPr>
+        <p:cNvPr id="1" name=""/>
+        <p:cNvGrpSpPr/>
+        <p:nvPr/>
+      </p:nvGrpSpPr>
+      <p:grpSpPr>
+        <a:xfrm>
+          <a:off x="0" y="0"/>
+          <a:ext cx="0" cy="0"/>
+          <a:chOff x="0" y="0"/>
+          <a:chExt cx="0" cy="0"/>
+        </a:xfrm>
+      </p:grpSpPr>
+      <p:sp>
+        <p:nvSpPr>
+          <p:cNvPr id="2" name="TextBox 1"/>
+          <p:cNvSpPr txBox="1"/>
+          <p:nvPr/>
+        </p:nvSpPr>
+        <p:spPr>
+          <a:xfrm>
+            <a:off x="1066801" y="152400"/>
+            <a:ext cx="7391400" cy="646331"/>
+          </a:xfrm>
+          <a:prstGeom prst="rect">
+            <a:avLst/>
+          </a:prstGeom>
+          <a:noFill/>
+        </p:spPr>
+        <p:txBody>
+          <a:bodyPr wrap="square" rtlCol="0">
+            <a:spAutoFit/>
+          </a:bodyPr>
+          <a:lstStyle/>
+          <a:p>
+            <a:pPr algn="ctr"/>
+            <a:r>
+              <a:rPr lang="en-US" sz="3600" dirty="0" smtClean="0"/>
+              <a:t>Advanced NETWORKING IN DOCKER</a:t>
+            </a:r>
+            <a:endParaRPr lang="en-US" sz="3600" dirty="0"/>
+          </a:p>
+        </p:txBody>
+      </p:sp>
+      <p:sp>
+        <p:nvSpPr>
+          <p:cNvPr id="3" name="TextBox 2"/>
+          <p:cNvSpPr txBox="1"/>
+          <p:nvPr/>
+        </p:nvSpPr>
+        <p:spPr>
+          <a:xfrm>
+            <a:off x="304800" y="798731"/>
+            <a:ext cx="8610599" cy="5909310"/>
+          </a:xfrm>
+          <a:prstGeom prst="rect">
+            <a:avLst/>
+          </a:prstGeom>
+          <a:noFill/>
+        </p:spPr>
+        <p:txBody>
+          <a:bodyPr wrap="square" rtlCol="0">
+            <a:spAutoFit/>
+          </a:bodyPr>
+          <a:lstStyle/>
+          <a:p>
+            <a:pPr marL="342900" indent="-342900">
+              <a:buAutoNum type="arabicPeriod"/>
+            </a:pPr>
+            <a:r>
+              <a:rPr lang="en-US" dirty="0" smtClean="0"/>
+              <a:t>Port Mapping .</a:t>
+            </a:r>
+          </a:p>
+          <a:p>
+            <a:pPr marL="342900" indent="-342900">
+              <a:buAutoNum type="arabicPeriod"/>
+            </a:pPr>
+            <a:r>
+              <a:rPr lang="en-US" dirty="0" smtClean="0"/>
+              <a:t>Port Redirecting.</a:t>
+            </a:r>
+          </a:p>
+          <a:p>
+            <a:pPr marL="342900" indent="-342900">
+              <a:buAutoNum type="arabicPeriod"/>
+            </a:pPr>
+            <a:r>
+              <a:rPr lang="en-US" dirty="0" smtClean="0"/>
+              <a:t>Host Networking.</a:t>
+            </a:r>
+          </a:p>
+          <a:p>
+            <a:r>
+              <a:rPr lang="en-US" b="1" dirty="0">
+                <a:solidFill>
+                  <a:srgbClr val="C00000"/>
+                </a:solidFill>
+              </a:rPr>
+              <a:t>Step 1: </a:t>
+            </a:r>
+            <a:r>
+              <a:rPr lang="en-US" dirty="0" smtClean="0"/>
+              <a:t>Run the container for mapping the port.</a:t>
+            </a:r>
+            <a:endParaRPr lang="en-US" dirty="0"/>
+          </a:p>
+          <a:p>
+            <a:r>
+              <a:rPr lang="en-US" b="1" i="1" dirty="0"/>
+              <a:t>$ </a:t>
+            </a:r>
+            <a:r>
+              <a:rPr lang="en-US" b="1" i="1" dirty="0" err="1"/>
+              <a:t>sudo</a:t>
+            </a:r>
+            <a:r>
+              <a:rPr lang="en-US" b="1" i="1" dirty="0"/>
+              <a:t> </a:t>
+            </a:r>
+            <a:r>
+              <a:rPr lang="en-US" b="1" i="1" dirty="0" err="1"/>
+              <a:t>docker</a:t>
+            </a:r>
+            <a:r>
+              <a:rPr lang="en-US" b="1" i="1" dirty="0"/>
+              <a:t> run –d </a:t>
+            </a:r>
+            <a:r>
+              <a:rPr lang="en-US" b="1" i="1" dirty="0" smtClean="0"/>
+              <a:t>–p 8080 </a:t>
+            </a:r>
+            <a:r>
+              <a:rPr lang="en-US" b="1" i="1" dirty="0" err="1" smtClean="0"/>
+              <a:t>adejonge</a:t>
+            </a:r>
+            <a:r>
+              <a:rPr lang="en-US" b="1" i="1" dirty="0" smtClean="0"/>
+              <a:t>/</a:t>
+            </a:r>
+            <a:r>
+              <a:rPr lang="en-US" b="1" i="1" dirty="0" err="1" smtClean="0"/>
+              <a:t>helloworld</a:t>
+            </a:r>
+            <a:r>
+              <a:rPr lang="en-US" b="1" i="1" dirty="0" smtClean="0"/>
+              <a:t> </a:t>
+            </a:r>
+            <a:r>
+              <a:rPr lang="en-US" dirty="0" smtClean="0"/>
+              <a:t>(</a:t>
+            </a:r>
+            <a:r>
+              <a:rPr lang="en-US" i="1" dirty="0" smtClean="0"/>
+              <a:t>Note</a:t>
+            </a:r>
+            <a:r>
+              <a:rPr lang="en-US" dirty="0" smtClean="0"/>
+              <a:t>:</a:t>
+            </a:r>
+            <a:r>
+              <a:rPr lang="en-US" b="1" i="1" dirty="0" smtClean="0"/>
+              <a:t> </a:t>
+            </a:r>
+            <a:r>
+              <a:rPr lang="en-US" dirty="0" smtClean="0"/>
+              <a:t>-p stand for </a:t>
+            </a:r>
+            <a:r>
+              <a:rPr lang="en-US" dirty="0" err="1" smtClean="0"/>
+              <a:t>pubish</a:t>
+            </a:r>
+            <a:r>
+              <a:rPr lang="en-US" dirty="0"/>
+              <a:t> </a:t>
+            </a:r>
+            <a:r>
+              <a:rPr lang="en-US" dirty="0" smtClean="0"/>
+              <a:t>port)</a:t>
+            </a:r>
+          </a:p>
+          <a:p>
+            <a:endParaRPr lang="en-US" dirty="0"/>
+          </a:p>
+          <a:p>
+            <a:endParaRPr lang="en-US" dirty="0" smtClean="0"/>
+          </a:p>
+          <a:p>
+            <a:endParaRPr lang="en-US" dirty="0"/>
+          </a:p>
+          <a:p>
+            <a:endParaRPr lang="en-US" dirty="0" smtClean="0"/>
+          </a:p>
+          <a:p>
+            <a:endParaRPr lang="en-US" dirty="0" smtClean="0"/>
+          </a:p>
+          <a:p>
+            <a:r>
+              <a:rPr lang="en-US" dirty="0" err="1" smtClean="0"/>
+              <a:t>Goto</a:t>
+            </a:r>
+            <a:r>
+              <a:rPr lang="en-US" dirty="0" smtClean="0"/>
+              <a:t> host browser and : www.&lt;locathost IP&gt;:32769</a:t>
+            </a:r>
+            <a:endParaRPr lang="en-US" dirty="0"/>
+          </a:p>
+          <a:p>
+            <a:r>
+              <a:rPr lang="en-US" b="1" dirty="0">
+                <a:solidFill>
+                  <a:srgbClr val="C00000"/>
+                </a:solidFill>
+              </a:rPr>
+              <a:t>Step 2: </a:t>
+            </a:r>
+            <a:r>
+              <a:rPr lang="en-US" dirty="0"/>
+              <a:t>Run this container in </a:t>
+            </a:r>
+            <a:r>
+              <a:rPr lang="en-US" dirty="0" smtClean="0"/>
+              <a:t>Redirecting the port.</a:t>
+            </a:r>
+            <a:endParaRPr lang="en-US" dirty="0"/>
+          </a:p>
+          <a:p>
+            <a:r>
+              <a:rPr lang="en-US" b="1" i="1" dirty="0"/>
+              <a:t>$ </a:t>
+            </a:r>
+            <a:r>
+              <a:rPr lang="en-US" b="1" i="1" dirty="0" err="1"/>
+              <a:t>sudo</a:t>
+            </a:r>
+            <a:r>
+              <a:rPr lang="en-US" b="1" i="1" dirty="0"/>
+              <a:t> </a:t>
+            </a:r>
+            <a:r>
+              <a:rPr lang="en-US" b="1" i="1" dirty="0" err="1"/>
+              <a:t>docker</a:t>
+            </a:r>
+            <a:r>
+              <a:rPr lang="en-US" b="1" i="1" dirty="0"/>
+              <a:t> run –d </a:t>
+            </a:r>
+            <a:r>
+              <a:rPr lang="en-US" b="1" i="1" dirty="0" smtClean="0"/>
+              <a:t>–p 9009:8080 </a:t>
+            </a:r>
+            <a:r>
+              <a:rPr lang="en-US" b="1" i="1" dirty="0" err="1" smtClean="0"/>
+              <a:t>adejonge</a:t>
+            </a:r>
+            <a:r>
+              <a:rPr lang="en-US" b="1" i="1" dirty="0" smtClean="0"/>
+              <a:t>/</a:t>
+            </a:r>
+            <a:r>
+              <a:rPr lang="en-US" b="1" i="1" dirty="0" err="1" smtClean="0"/>
+              <a:t>helloworld</a:t>
+            </a:r>
+            <a:r>
+              <a:rPr lang="en-US" b="1" i="1" dirty="0" smtClean="0"/>
+              <a:t> (With this command one can assign your </a:t>
+            </a:r>
+            <a:r>
+              <a:rPr lang="en-US" b="1" i="1" dirty="0" err="1" smtClean="0"/>
+              <a:t>prefered</a:t>
+            </a:r>
+            <a:r>
+              <a:rPr lang="en-US" b="1" i="1" dirty="0" smtClean="0"/>
+              <a:t> port number rather than random number by Docker engine)</a:t>
+            </a:r>
+          </a:p>
+          <a:p>
+            <a:r>
+              <a:rPr lang="en-US" b="1" dirty="0" smtClean="0">
+                <a:solidFill>
+                  <a:srgbClr val="C00000"/>
+                </a:solidFill>
+              </a:rPr>
+              <a:t>Step </a:t>
+            </a:r>
+            <a:r>
+              <a:rPr lang="en-US" b="1" dirty="0">
+                <a:solidFill>
+                  <a:srgbClr val="C00000"/>
+                </a:solidFill>
+              </a:rPr>
+              <a:t>3 : </a:t>
+            </a:r>
+            <a:r>
+              <a:rPr lang="en-US" dirty="0" smtClean="0"/>
+              <a:t>Sharing the HOST IP for </a:t>
+            </a:r>
+            <a:r>
+              <a:rPr lang="en-US" dirty="0"/>
+              <a:t>this </a:t>
+            </a:r>
+            <a:r>
+              <a:rPr lang="en-US" dirty="0" err="1"/>
+              <a:t>contianer</a:t>
+            </a:r>
+            <a:r>
+              <a:rPr lang="en-US" dirty="0" smtClean="0"/>
+              <a:t>.</a:t>
+            </a:r>
+            <a:endParaRPr lang="en-US" b="1" i="1" dirty="0"/>
+          </a:p>
+          <a:p>
+            <a:r>
+              <a:rPr lang="en-US" b="1" i="1" dirty="0"/>
+              <a:t>$ </a:t>
+            </a:r>
+            <a:r>
+              <a:rPr lang="en-US" b="1" i="1" dirty="0" err="1"/>
+              <a:t>sudo</a:t>
+            </a:r>
+            <a:r>
+              <a:rPr lang="en-US" b="1" i="1" dirty="0"/>
+              <a:t> </a:t>
+            </a:r>
+            <a:r>
+              <a:rPr lang="en-US" b="1" i="1" dirty="0" err="1"/>
+              <a:t>docker</a:t>
+            </a:r>
+            <a:r>
+              <a:rPr lang="en-US" b="1" i="1" dirty="0"/>
+              <a:t> </a:t>
+            </a:r>
+            <a:r>
+              <a:rPr lang="en-US" b="1" i="1" dirty="0" smtClean="0"/>
+              <a:t>–d - -net= host	</a:t>
+            </a:r>
+            <a:r>
+              <a:rPr lang="en-US" b="1" i="1" dirty="0" err="1" smtClean="0"/>
+              <a:t>adejonge</a:t>
+            </a:r>
+            <a:r>
+              <a:rPr lang="en-US" b="1" i="1" dirty="0" smtClean="0"/>
+              <a:t>/</a:t>
+            </a:r>
+            <a:r>
+              <a:rPr lang="en-US" b="1" i="1" dirty="0" err="1" smtClean="0"/>
+              <a:t>helloworld</a:t>
+            </a:r>
+            <a:r>
+              <a:rPr lang="en-US" dirty="0" smtClean="0"/>
+              <a:t> </a:t>
+            </a:r>
+            <a:r>
+              <a:rPr lang="en-US" b="1" i="1" dirty="0" smtClean="0"/>
+              <a:t>(This would share the host IP and DOES NOT use BRIDGE NETWORKING  and Hence no V-</a:t>
+            </a:r>
+            <a:r>
+              <a:rPr lang="en-US" b="1" i="1" dirty="0" err="1" smtClean="0"/>
+              <a:t>etherNET</a:t>
+            </a:r>
+            <a:r>
+              <a:rPr lang="en-US" b="1" i="1" dirty="0" smtClean="0"/>
+              <a:t>.)</a:t>
+            </a:r>
+            <a:endParaRPr lang="en-US" b="1" i="1" dirty="0"/>
+          </a:p>
+          <a:p>
+            <a:r>
+              <a:rPr lang="en-US" b="1" i="1" dirty="0"/>
+              <a:t>$ </a:t>
+            </a:r>
+            <a:r>
+              <a:rPr lang="en-US" b="1" i="1" dirty="0" err="1"/>
+              <a:t>sudo</a:t>
+            </a:r>
+            <a:r>
+              <a:rPr lang="en-US" b="1" i="1" dirty="0"/>
+              <a:t> </a:t>
+            </a:r>
+            <a:r>
+              <a:rPr lang="en-US" b="1" i="1" dirty="0" err="1"/>
+              <a:t>docker</a:t>
+            </a:r>
+            <a:r>
+              <a:rPr lang="en-US" b="1" i="1" dirty="0"/>
+              <a:t> inspect </a:t>
+            </a:r>
+            <a:r>
+              <a:rPr lang="en-US" b="1" i="1" dirty="0" err="1" smtClean="0"/>
+              <a:t>adejonge</a:t>
+            </a:r>
+            <a:r>
+              <a:rPr lang="en-US" b="1" i="1" dirty="0" smtClean="0"/>
+              <a:t>/</a:t>
+            </a:r>
+            <a:r>
+              <a:rPr lang="en-US" b="1" i="1" dirty="0" err="1" smtClean="0"/>
+              <a:t>helloworld</a:t>
+            </a:r>
+            <a:r>
+              <a:rPr lang="en-US" dirty="0" smtClean="0"/>
+              <a:t> </a:t>
+            </a:r>
+            <a:r>
+              <a:rPr lang="en-US" dirty="0"/>
+              <a:t>| grep </a:t>
+            </a:r>
+            <a:r>
+              <a:rPr lang="en-US" dirty="0" smtClean="0"/>
+              <a:t>IP</a:t>
+            </a:r>
+            <a:endParaRPr lang="en-US" dirty="0"/>
+          </a:p>
+          <a:p>
+            <a:r>
+              <a:rPr lang="en-US" dirty="0"/>
+              <a:t>Exactly here check for </a:t>
+            </a:r>
+          </a:p>
+          <a:p>
+            <a:r>
+              <a:rPr lang="en-US" b="1" i="1" dirty="0"/>
+              <a:t>$ </a:t>
+            </a:r>
+            <a:r>
+              <a:rPr lang="en-US" b="1" i="1" dirty="0" err="1"/>
+              <a:t>ifconfig</a:t>
+            </a:r>
+            <a:r>
+              <a:rPr lang="en-US" b="1" i="1" dirty="0"/>
+              <a:t>   </a:t>
+            </a:r>
+          </a:p>
+          <a:p>
+            <a:r>
+              <a:rPr lang="en-US" dirty="0"/>
+              <a:t>You would find an eht0 and docker0 </a:t>
+            </a:r>
+            <a:r>
+              <a:rPr lang="en-US" dirty="0" smtClean="0"/>
+              <a:t>but NOT </a:t>
+            </a:r>
+            <a:r>
+              <a:rPr lang="en-US" b="1" dirty="0" err="1"/>
+              <a:t>VetnXXX</a:t>
+            </a:r>
+            <a:r>
+              <a:rPr lang="en-US" b="1" dirty="0"/>
+              <a:t>. </a:t>
+            </a:r>
+            <a:r>
+              <a:rPr lang="en-US" b="1" dirty="0" smtClean="0"/>
+              <a:t> </a:t>
+            </a:r>
+            <a:endParaRPr lang="en-US" b="1" dirty="0"/>
+          </a:p>
+        </p:txBody>
+      </p:sp>
+      <p:pic>
+        <p:nvPicPr>
+          <p:cNvPr id="3074" name="Picture 2"/>
+          <p:cNvPicPr>
+            <a:picLocks noChangeAspect="1" noChangeArrowheads="1"/>
+          </p:cNvPicPr>
+          <p:nvPr/>
+        </p:nvPicPr>
+        <p:blipFill>
+          <a:blip r:embed="rId2">
+            <a:extLst>
+              <a:ext uri="{28A0092B-C50C-407E-A947-70E740481C1C}">
+                <a14:useLocalDpi xmlns:a14="http://schemas.microsoft.com/office/drawing/2010/main" val="0"/>
+              </a:ext>
+            </a:extLst>
+          </a:blip>
+          <a:srcRect/>
+          <a:stretch>
+            <a:fillRect/>
+          </a:stretch>
+        </p:blipFill>
+        <p:spPr bwMode="auto">
+          <a:xfrm>
+            <a:off x="228599" y="2286000"/>
+            <a:ext cx="8686799" cy="1119187"/>
+          </a:xfrm>
+          <a:prstGeom prst="rect">
+            <a:avLst/>
+          </a:prstGeom>
+          <a:noFill/>
+          <a:ln>
+            <a:noFill/>
+          </a:ln>
+          <a:extLst>
+            <a:ext uri="{909E8E84-426E-40DD-AFC4-6F175D3DCCD1}">
+              <a14:hiddenFill xmlns:a14="http://schemas.microsoft.com/office/drawing/2010/main">
+                <a:solidFill>
+                  <a:schemeClr val="accent1"/>
+                </a:solidFill>
+              </a14:hiddenFill>
+            </a:ext>
+            <a:ext uri="{91240B29-F687-4F45-9708-019B960494DF}">
+              <a14:hiddenLine xmlns:a14="http://schemas.microsoft.com/office/drawing/2010/main" w="9525">
+                <a:solidFill>
+                  <a:schemeClr val="tx1"/>
+                </a:solidFill>
+                <a:miter lim="800000"/>
+                <a:headEnd/>
+                <a:tailEnd/>
+              </a14:hiddenLine>
+            </a:ext>
+          </a:extLst>
+        </p:spPr>
+      </p:pic>
+      <p:pic>
+        <p:nvPicPr>
+          <p:cNvPr id="3075" name="Picture 3"/>
+          <p:cNvPicPr>
+            <a:picLocks noChangeAspect="1" noChangeArrowheads="1"/>
+          </p:cNvPicPr>
+          <p:nvPr/>
+        </p:nvPicPr>
+        <p:blipFill>
+          <a:blip r:embed="rId3">
+            <a:extLst>
+              <a:ext uri="{28A0092B-C50C-407E-A947-70E740481C1C}">
+                <a14:useLocalDpi xmlns:a14="http://schemas.microsoft.com/office/drawing/2010/main" val="0"/>
+              </a:ext>
+            </a:extLst>
+          </a:blip>
+          <a:srcRect/>
+          <a:stretch>
+            <a:fillRect/>
+          </a:stretch>
+        </p:blipFill>
+        <p:spPr bwMode="auto">
+          <a:xfrm>
+            <a:off x="5522493" y="5531082"/>
+            <a:ext cx="3429001" cy="1098318"/>
+          </a:xfrm>
+          <a:prstGeom prst="rect">
+            <a:avLst/>
+          </a:prstGeom>
+          <a:noFill/>
+          <a:ln>
+            <a:noFill/>
+          </a:ln>
+          <a:extLst>
+            <a:ext uri="{909E8E84-426E-40DD-AFC4-6F175D3DCCD1}">
+              <a14:hiddenFill xmlns:a14="http://schemas.microsoft.com/office/drawing/2010/main">
+                <a:solidFill>
+                  <a:schemeClr val="accent1"/>
+                </a:solidFill>
+              </a14:hiddenFill>
+            </a:ext>
+            <a:ext uri="{91240B29-F687-4F45-9708-019B960494DF}">
+              <a14:hiddenLine xmlns:a14="http://schemas.microsoft.com/office/drawing/2010/main" w="9525">
+                <a:solidFill>
+                  <a:schemeClr val="tx1"/>
+                </a:solidFill>
+                <a:miter lim="800000"/>
+                <a:headEnd/>
+                <a:tailEnd/>
+              </a14:hiddenLine>
+            </a:ext>
+          </a:extLst>
+        </p:spPr>
+      </p:pic>
+    </p:spTree>
+    <p:extLst>
+      <p:ext uri="{BB962C8B-B14F-4D97-AF65-F5344CB8AC3E}">
+        <p14:creationId xmlns:p14="http://schemas.microsoft.com/office/powerpoint/2010/main" val="486706405"/>
+      </p:ext>
+    </p:extLst>
+  </p:cSld>
+  <p:clrMapOvr>
+    <a:masterClrMapping/>
+  </p:clrMapOvr>
+  <p:timing>
+    <p:tnLst>
+      <p:par>
+        <p:cTn id="1" dur="indefinite" restart="never" nodeType="tmRoot"/>
+      </p:par>
+    </p:tnLst>
+  </p:timing>
+</p:sld>
+</file>
+
+<file path=ppt/slides/slide12.xml><?xml version="1.0" encoding="utf-8"?>
+<p:sld xmlns:a="http://schemas.openxmlformats.org/drawingml/2006/main" xmlns:r="http://schemas.openxmlformats.org/officeDocument/2006/relationships" xmlns:p="http://schemas.openxmlformats.org/presentationml/2006/main">
+  <p:cSld>
+    <p:spTree>
+      <p:nvGrpSpPr>
+        <p:cNvPr id="1" name=""/>
+        <p:cNvGrpSpPr/>
+        <p:nvPr/>
+      </p:nvGrpSpPr>
+      <p:grpSpPr>
+        <a:xfrm>
+          <a:off x="0" y="0"/>
+          <a:ext cx="0" cy="0"/>
+          <a:chOff x="0" y="0"/>
+          <a:chExt cx="0" cy="0"/>
+        </a:xfrm>
+      </p:grpSpPr>
       <p:pic>
         <p:nvPicPr>
           <p:cNvPr id="1026" name="Picture 2"/>
@@ -5272,7 +6486,7 @@
         <p:spPr>
           <a:xfrm>
             <a:off x="533400" y="990600"/>
-            <a:ext cx="8305800" cy="5078313"/>
+            <a:ext cx="8305800" cy="5909310"/>
           </a:xfrm>
           <a:prstGeom prst="rect">
             <a:avLst/>
@@ -5370,149 +6584,162 @@
           </a:p>
           <a:p>
             <a:r>
-              <a:rPr lang="en-US" dirty="0"/>
+              <a:rPr lang="en-US" b="1" i="1" dirty="0"/>
               <a:t>$ </a:t>
             </a:r>
             <a:r>
-              <a:rPr lang="en-US" dirty="0" err="1"/>
+              <a:rPr lang="en-US" b="1" i="1" dirty="0" err="1"/>
               <a:t>sudo</a:t>
             </a:r>
             <a:r>
-              <a:rPr lang="en-US" dirty="0"/>
+              <a:rPr lang="en-US" b="1" i="1" dirty="0"/>
               <a:t> </a:t>
             </a:r>
             <a:r>
-              <a:rPr lang="en-US" dirty="0" err="1"/>
+              <a:rPr lang="en-US" b="1" i="1" dirty="0" err="1"/>
               <a:t>docker</a:t>
             </a:r>
             <a:r>
-              <a:rPr lang="en-US" dirty="0"/>
+              <a:rPr lang="en-US" b="1" i="1" dirty="0"/>
               <a:t> run -d centos /bin….</a:t>
             </a:r>
           </a:p>
           <a:p>
             <a:r>
-              <a:rPr lang="en-US" dirty="0"/>
+              <a:rPr lang="en-US" b="1" i="1" dirty="0"/>
               <a:t>$ </a:t>
             </a:r>
             <a:r>
-              <a:rPr lang="en-US" dirty="0" err="1"/>
+              <a:rPr lang="en-US" b="1" i="1" dirty="0" err="1"/>
               <a:t>sudo</a:t>
             </a:r>
             <a:r>
-              <a:rPr lang="en-US" dirty="0"/>
+              <a:rPr lang="en-US" b="1" i="1" dirty="0"/>
               <a:t> </a:t>
             </a:r>
             <a:r>
-              <a:rPr lang="en-US" dirty="0" err="1"/>
+              <a:rPr lang="en-US" b="1" i="1" dirty="0" err="1"/>
               <a:t>docker</a:t>
             </a:r>
             <a:r>
-              <a:rPr lang="en-US" dirty="0"/>
+              <a:rPr lang="en-US" b="1" i="1" dirty="0"/>
               <a:t> </a:t>
             </a:r>
             <a:r>
-              <a:rPr lang="en-US" dirty="0" err="1"/>
+              <a:rPr lang="en-US" b="1" i="1" dirty="0" err="1"/>
               <a:t>ps</a:t>
             </a:r>
             <a:r>
-              <a:rPr lang="en-US" dirty="0"/>
+              <a:rPr lang="en-US" b="1" i="1" dirty="0"/>
               <a:t>  (</a:t>
             </a:r>
             <a:r>
-              <a:rPr lang="en-US" dirty="0" err="1"/>
+              <a:rPr lang="en-US" b="1" i="1" dirty="0" err="1"/>
               <a:t>docker</a:t>
             </a:r>
             <a:r>
-              <a:rPr lang="en-US" dirty="0"/>
-              <a:t> process running)</a:t>
-            </a:r>
-          </a:p>
-          <a:p>
-            <a:r>
-              <a:rPr lang="en-US" dirty="0"/>
+              <a:rPr lang="en-US" b="1" i="1" dirty="0"/>
+              <a:t> process running</a:t>
+            </a:r>
+            <a:r>
+              <a:rPr lang="en-US" b="1" i="1" dirty="0" smtClean="0"/>
+              <a:t>)</a:t>
+            </a:r>
+          </a:p>
+          <a:p>
+            <a:endParaRPr lang="en-US" b="1" i="1" dirty="0" smtClean="0"/>
+          </a:p>
+          <a:p>
+            <a:endParaRPr lang="en-US" b="1" i="1" dirty="0"/>
+          </a:p>
+          <a:p>
+            <a:endParaRPr lang="en-US" b="1" i="1" dirty="0"/>
+          </a:p>
+          <a:p>
+            <a:r>
+              <a:rPr lang="en-US" b="1" i="1" dirty="0"/>
               <a:t>$ </a:t>
             </a:r>
             <a:r>
-              <a:rPr lang="en-US" dirty="0" err="1"/>
+              <a:rPr lang="en-US" b="1" i="1" dirty="0" err="1"/>
               <a:t>sudo</a:t>
             </a:r>
             <a:r>
-              <a:rPr lang="en-US" dirty="0"/>
+              <a:rPr lang="en-US" b="1" i="1" dirty="0"/>
               <a:t> </a:t>
             </a:r>
             <a:r>
-              <a:rPr lang="en-US" dirty="0" err="1"/>
+              <a:rPr lang="en-US" b="1" i="1" dirty="0" err="1"/>
               <a:t>docker</a:t>
             </a:r>
             <a:r>
-              <a:rPr lang="en-US" dirty="0"/>
+              <a:rPr lang="en-US" b="1" i="1" dirty="0"/>
               <a:t> logs &lt;Cont. Name/Cont.ID&gt;</a:t>
             </a:r>
           </a:p>
           <a:p>
             <a:r>
-              <a:rPr lang="en-US" dirty="0"/>
+              <a:rPr lang="en-US" b="1" i="1" dirty="0"/>
               <a:t>$ </a:t>
             </a:r>
             <a:r>
-              <a:rPr lang="en-US" dirty="0" err="1"/>
+              <a:rPr lang="en-US" b="1" i="1" dirty="0" err="1"/>
               <a:t>sudo</a:t>
             </a:r>
             <a:r>
-              <a:rPr lang="en-US" dirty="0"/>
+              <a:rPr lang="en-US" b="1" i="1" dirty="0"/>
               <a:t> </a:t>
             </a:r>
             <a:r>
-              <a:rPr lang="en-US" dirty="0" err="1"/>
+              <a:rPr lang="en-US" b="1" i="1" dirty="0" err="1"/>
               <a:t>docker</a:t>
             </a:r>
             <a:r>
-              <a:rPr lang="en-US" dirty="0"/>
+              <a:rPr lang="en-US" b="1" i="1" dirty="0"/>
               <a:t> stop &lt;Cont. Name/Cont.ID&gt;</a:t>
             </a:r>
           </a:p>
           <a:p>
             <a:r>
-              <a:rPr lang="en-US" dirty="0"/>
+              <a:rPr lang="en-US" b="1" i="1" dirty="0"/>
               <a:t>Check for </a:t>
             </a:r>
           </a:p>
           <a:p>
             <a:r>
-              <a:rPr lang="en-US" dirty="0"/>
+              <a:rPr lang="en-US" b="1" i="1" dirty="0"/>
               <a:t>$ </a:t>
             </a:r>
             <a:r>
-              <a:rPr lang="en-US" dirty="0" err="1"/>
+              <a:rPr lang="en-US" b="1" i="1" dirty="0" err="1"/>
               <a:t>sudo</a:t>
             </a:r>
             <a:r>
-              <a:rPr lang="en-US" dirty="0"/>
+              <a:rPr lang="en-US" b="1" i="1" dirty="0"/>
               <a:t> </a:t>
             </a:r>
             <a:r>
-              <a:rPr lang="en-US" dirty="0" err="1"/>
+              <a:rPr lang="en-US" b="1" i="1" dirty="0" err="1"/>
               <a:t>docker</a:t>
             </a:r>
             <a:r>
-              <a:rPr lang="en-US" dirty="0"/>
+              <a:rPr lang="en-US" b="1" i="1" dirty="0"/>
               <a:t> -</a:t>
             </a:r>
             <a:r>
-              <a:rPr lang="en-US" dirty="0" err="1"/>
+              <a:rPr lang="en-US" b="1" i="1" dirty="0" err="1"/>
               <a:t>ps</a:t>
             </a:r>
             <a:r>
-              <a:rPr lang="en-US" dirty="0"/>
+              <a:rPr lang="en-US" b="1" i="1" dirty="0"/>
               <a:t>  (</a:t>
             </a:r>
             <a:r>
-              <a:rPr lang="en-US" dirty="0" err="1"/>
+              <a:rPr lang="en-US" b="1" i="1" dirty="0" err="1"/>
               <a:t>docker</a:t>
             </a:r>
             <a:r>
-              <a:rPr lang="en-US" dirty="0"/>
+              <a:rPr lang="en-US" b="1" i="1" dirty="0"/>
               <a:t> process running)</a:t>
             </a:r>
           </a:p>
@@ -5525,6 +6752,60 @@
           </a:p>
         </p:txBody>
       </p:sp>
+      <p:pic>
+        <p:nvPicPr>
+          <p:cNvPr id="2050" name="Picture 2"/>
+          <p:cNvPicPr>
+            <a:picLocks noChangeAspect="1" noChangeArrowheads="1"/>
+          </p:cNvPicPr>
+          <p:nvPr/>
+        </p:nvPicPr>
+        <p:blipFill>
+          <a:blip r:embed="rId3">
+            <a:extLst>
+              <a:ext uri="{28A0092B-C50C-407E-A947-70E740481C1C}">
+                <a14:useLocalDpi xmlns:a14="http://schemas.microsoft.com/office/drawing/2010/main" val="0"/>
+              </a:ext>
+            </a:extLst>
+          </a:blip>
+          <a:srcRect/>
+          <a:stretch>
+            <a:fillRect/>
+          </a:stretch>
+        </p:blipFill>
+        <p:spPr bwMode="auto">
+          <a:xfrm>
+            <a:off x="228600" y="4629691"/>
+            <a:ext cx="8763000" cy="780509"/>
+          </a:xfrm>
+          <a:prstGeom prst="rect">
+            <a:avLst/>
+          </a:prstGeom>
+          <a:noFill/>
+          <a:ln>
+            <a:noFill/>
+          </a:ln>
+          <a:extLst>
+            <a:ext uri="{909E8E84-426E-40DD-AFC4-6F175D3DCCD1}">
+              <a14:hiddenFill xmlns:a14="http://schemas.microsoft.com/office/drawing/2010/main">
+                <a:solidFill>
+                  <a:schemeClr val="accent1"/>
+                </a:solidFill>
+              </a14:hiddenFill>
+            </a:ext>
+            <a:ext uri="{91240B29-F687-4F45-9708-019B960494DF}">
+              <a14:hiddenLine xmlns:a14="http://schemas.microsoft.com/office/drawing/2010/main" w="9525">
+                <a:solidFill>
+                  <a:schemeClr val="tx1"/>
+                </a:solidFill>
+                <a:miter lim="800000"/>
+                <a:headEnd/>
+                <a:tailEnd/>
+              </a14:hiddenLine>
+            </a:ext>
+          </a:extLst>
+        </p:spPr>
+      </p:pic>
     </p:spTree>
     <p:extLst>
       <p:ext uri="{BB962C8B-B14F-4D97-AF65-F5344CB8AC3E}">
@@ -5563,8 +6844,8 @@
         </p:nvSpPr>
         <p:spPr>
           <a:xfrm>
-            <a:off x="826168" y="795010"/>
-            <a:ext cx="5925020" cy="369332"/>
+            <a:off x="826167" y="799021"/>
+            <a:ext cx="7708233" cy="5355312"/>
           </a:xfrm>
           <a:prstGeom prst="rect">
             <a:avLst/>
@@ -5572,15 +6853,297 @@
           <a:noFill/>
         </p:spPr>
         <p:txBody>
-          <a:bodyPr wrap="none" rtlCol="0">
+          <a:bodyPr wrap="square" rtlCol="0">
             <a:spAutoFit/>
           </a:bodyPr>
           <a:lstStyle/>
           <a:p>
             <a:r>
               <a:rPr lang="en-US" dirty="0" smtClean="0"/>
-              <a:t>Learn how to Start, Stop and remove containers and Images.</a:t>
-            </a:r>
+              <a:t>Learn how to </a:t>
+            </a:r>
+          </a:p>
+          <a:p>
+            <a:r>
+              <a:rPr lang="en-US" dirty="0" smtClean="0"/>
+              <a:t>1. Updating and deleting Imaged.</a:t>
+            </a:r>
+          </a:p>
+          <a:p>
+            <a:r>
+              <a:rPr lang="en-US" dirty="0" smtClean="0"/>
+              <a:t>2. Start, Stop and remove containers and Images.</a:t>
+            </a:r>
+          </a:p>
+          <a:p>
+            <a:endParaRPr lang="en-US" dirty="0"/>
+          </a:p>
+          <a:p>
+            <a:r>
+              <a:rPr lang="en-US" dirty="0" smtClean="0"/>
+              <a:t>First of all check the Images in your environment.</a:t>
+            </a:r>
+          </a:p>
+          <a:p>
+            <a:r>
+              <a:rPr lang="en-US" b="1" i="1" dirty="0" smtClean="0"/>
+              <a:t>$ </a:t>
+            </a:r>
+            <a:r>
+              <a:rPr lang="en-US" b="1" i="1" dirty="0" err="1"/>
+              <a:t>sudo</a:t>
+            </a:r>
+            <a:r>
+              <a:rPr lang="en-US" b="1" i="1" dirty="0"/>
+              <a:t> </a:t>
+            </a:r>
+            <a:r>
+              <a:rPr lang="en-US" b="1" i="1" dirty="0" err="1"/>
+              <a:t>docker</a:t>
+            </a:r>
+            <a:r>
+              <a:rPr lang="en-US" b="1" i="1" dirty="0"/>
+              <a:t> </a:t>
+            </a:r>
+            <a:r>
+              <a:rPr lang="en-US" b="1" i="1" dirty="0" smtClean="0"/>
+              <a:t>images</a:t>
+            </a:r>
+          </a:p>
+          <a:p>
+            <a:r>
+              <a:rPr lang="en-US" b="1" i="1" dirty="0" smtClean="0"/>
+              <a:t> </a:t>
+            </a:r>
+          </a:p>
+          <a:p>
+            <a:endParaRPr lang="en-US" b="1" i="1" dirty="0"/>
+          </a:p>
+          <a:p>
+            <a:r>
+              <a:rPr lang="en-US" b="1" i="1" dirty="0"/>
+              <a:t>$ </a:t>
+            </a:r>
+            <a:r>
+              <a:rPr lang="en-US" b="1" i="1" dirty="0" err="1"/>
+              <a:t>sudo</a:t>
+            </a:r>
+            <a:r>
+              <a:rPr lang="en-US" b="1" i="1" dirty="0"/>
+              <a:t> </a:t>
+            </a:r>
+            <a:r>
+              <a:rPr lang="en-US" b="1" i="1" dirty="0" err="1"/>
+              <a:t>docker</a:t>
+            </a:r>
+            <a:r>
+              <a:rPr lang="en-US" b="1" i="1" dirty="0"/>
+              <a:t> </a:t>
+            </a:r>
+            <a:r>
+              <a:rPr lang="en-US" b="1" i="1" dirty="0" smtClean="0"/>
+              <a:t>search </a:t>
+            </a:r>
+            <a:r>
+              <a:rPr lang="en-US" b="1" i="1" dirty="0" err="1" smtClean="0"/>
+              <a:t>php</a:t>
+            </a:r>
+            <a:r>
+              <a:rPr lang="en-US" b="1" i="1" dirty="0" smtClean="0"/>
+              <a:t> (“check for the image in Docker HUB”)</a:t>
+            </a:r>
+            <a:endParaRPr lang="en-US" b="1" i="1" dirty="0"/>
+          </a:p>
+          <a:p>
+            <a:r>
+              <a:rPr lang="en-US" b="1" i="1" dirty="0"/>
+              <a:t>$ </a:t>
+            </a:r>
+            <a:r>
+              <a:rPr lang="en-US" b="1" i="1" dirty="0" err="1"/>
+              <a:t>sudo</a:t>
+            </a:r>
+            <a:r>
+              <a:rPr lang="en-US" b="1" i="1" dirty="0"/>
+              <a:t> </a:t>
+            </a:r>
+            <a:r>
+              <a:rPr lang="en-US" b="1" i="1" dirty="0" err="1"/>
+              <a:t>docker</a:t>
+            </a:r>
+            <a:r>
+              <a:rPr lang="en-US" b="1" i="1" dirty="0"/>
+              <a:t> </a:t>
+            </a:r>
+            <a:r>
+              <a:rPr lang="en-US" b="1" i="1" dirty="0" smtClean="0"/>
+              <a:t>pull </a:t>
+            </a:r>
+            <a:r>
+              <a:rPr lang="en-US" b="1" i="1" dirty="0" err="1" smtClean="0"/>
+              <a:t>php</a:t>
+            </a:r>
+            <a:r>
+              <a:rPr lang="en-US" b="1" i="1" dirty="0" smtClean="0"/>
+              <a:t> (pull and download the image from Docker hub)</a:t>
+            </a:r>
+            <a:endParaRPr lang="en-US" b="1" i="1" dirty="0"/>
+          </a:p>
+          <a:p>
+            <a:r>
+              <a:rPr lang="en-US" b="1" i="1" dirty="0"/>
+              <a:t>$ </a:t>
+            </a:r>
+            <a:r>
+              <a:rPr lang="en-US" b="1" i="1" dirty="0" err="1"/>
+              <a:t>sudo</a:t>
+            </a:r>
+            <a:r>
+              <a:rPr lang="en-US" b="1" i="1" dirty="0"/>
+              <a:t> </a:t>
+            </a:r>
+            <a:r>
+              <a:rPr lang="en-US" b="1" i="1" dirty="0" err="1"/>
+              <a:t>docker</a:t>
+            </a:r>
+            <a:r>
+              <a:rPr lang="en-US" b="1" i="1" dirty="0"/>
+              <a:t> </a:t>
+            </a:r>
+            <a:r>
+              <a:rPr lang="en-US" b="1" i="1" dirty="0" err="1" smtClean="0"/>
+              <a:t>rmi</a:t>
+            </a:r>
+            <a:r>
+              <a:rPr lang="en-US" b="1" i="1" dirty="0" smtClean="0"/>
+              <a:t> &lt;image name&gt;</a:t>
+            </a:r>
+          </a:p>
+          <a:p>
+            <a:r>
+              <a:rPr lang="en-US" b="1" i="1" dirty="0" smtClean="0"/>
+              <a:t>$ </a:t>
+            </a:r>
+            <a:r>
+              <a:rPr lang="en-US" b="1" i="1" dirty="0" err="1" smtClean="0"/>
+              <a:t>sudo</a:t>
+            </a:r>
+            <a:r>
+              <a:rPr lang="en-US" b="1" i="1" dirty="0" smtClean="0"/>
+              <a:t> </a:t>
+            </a:r>
+            <a:r>
+              <a:rPr lang="en-US" b="1" i="1" dirty="0" err="1" smtClean="0"/>
+              <a:t>docker</a:t>
+            </a:r>
+            <a:r>
+              <a:rPr lang="en-US" b="1" i="1" dirty="0" smtClean="0"/>
+              <a:t> pull &lt;image name&gt; (to update the existing image or download the latest)</a:t>
+            </a:r>
+            <a:endParaRPr lang="en-US" b="1" i="1" dirty="0"/>
+          </a:p>
+          <a:p>
+            <a:r>
+              <a:rPr lang="en-US" b="1" i="1" dirty="0"/>
+              <a:t>Check for </a:t>
+            </a:r>
+            <a:r>
+              <a:rPr lang="en-US" b="1" i="1" dirty="0" smtClean="0"/>
+              <a:t>the running or stopped Container</a:t>
+            </a:r>
+            <a:endParaRPr lang="en-US" b="1" i="1" dirty="0"/>
+          </a:p>
+          <a:p>
+            <a:r>
+              <a:rPr lang="en-US" b="1" i="1" dirty="0"/>
+              <a:t>$ </a:t>
+            </a:r>
+            <a:r>
+              <a:rPr lang="en-US" b="1" i="1" dirty="0" err="1"/>
+              <a:t>sudo</a:t>
+            </a:r>
+            <a:r>
+              <a:rPr lang="en-US" b="1" i="1" dirty="0"/>
+              <a:t> </a:t>
+            </a:r>
+            <a:r>
+              <a:rPr lang="en-US" b="1" i="1" dirty="0" err="1"/>
+              <a:t>docker</a:t>
+            </a:r>
+            <a:r>
+              <a:rPr lang="en-US" b="1" i="1" dirty="0"/>
+              <a:t> </a:t>
+            </a:r>
+            <a:r>
+              <a:rPr lang="en-US" b="1" i="1" dirty="0" err="1" smtClean="0"/>
+              <a:t>ps</a:t>
+            </a:r>
+            <a:r>
+              <a:rPr lang="en-US" b="1" i="1" dirty="0" smtClean="0"/>
+              <a:t> -a  (running and </a:t>
+            </a:r>
+            <a:r>
+              <a:rPr lang="en-US" b="1" i="1" dirty="0" err="1" smtClean="0"/>
+              <a:t>stoped</a:t>
+            </a:r>
+            <a:r>
+              <a:rPr lang="en-US" b="1" i="1" dirty="0" smtClean="0"/>
+              <a:t> container)</a:t>
+            </a:r>
+          </a:p>
+          <a:p>
+            <a:r>
+              <a:rPr lang="en-US" b="1" i="1" dirty="0" smtClean="0"/>
+              <a:t>$ </a:t>
+            </a:r>
+            <a:r>
+              <a:rPr lang="en-US" b="1" i="1" dirty="0" err="1" smtClean="0"/>
+              <a:t>sudo</a:t>
+            </a:r>
+            <a:r>
+              <a:rPr lang="en-US" b="1" i="1" dirty="0" smtClean="0"/>
+              <a:t> </a:t>
+            </a:r>
+            <a:r>
+              <a:rPr lang="en-US" b="1" i="1" dirty="0" err="1" smtClean="0"/>
+              <a:t>docker</a:t>
+            </a:r>
+            <a:r>
+              <a:rPr lang="en-US" b="1" i="1" dirty="0" smtClean="0"/>
+              <a:t> </a:t>
+            </a:r>
+            <a:r>
+              <a:rPr lang="en-US" b="1" i="1" dirty="0" err="1" smtClean="0"/>
+              <a:t>rm</a:t>
+            </a:r>
+            <a:r>
+              <a:rPr lang="en-US" b="1" i="1" dirty="0" smtClean="0"/>
+              <a:t> –f  &lt;</a:t>
+            </a:r>
+            <a:r>
+              <a:rPr lang="en-US" b="1" i="1" dirty="0" err="1" smtClean="0"/>
+              <a:t>Cont.Name</a:t>
+            </a:r>
+            <a:r>
+              <a:rPr lang="en-US" b="1" i="1" dirty="0"/>
+              <a:t> </a:t>
+            </a:r>
+            <a:r>
+              <a:rPr lang="en-US" b="1" i="1" dirty="0" smtClean="0"/>
+              <a:t>or Cont.ID&gt;</a:t>
+            </a:r>
+            <a:endParaRPr lang="en-US" b="1" i="1" dirty="0"/>
+          </a:p>
+          <a:p>
+            <a:r>
+              <a:rPr lang="en-US" dirty="0"/>
+              <a:t> </a:t>
+            </a:r>
+          </a:p>
+          <a:p>
+            <a:endParaRPr lang="en-US" dirty="0" smtClean="0"/>
+          </a:p>
+          <a:p>
             <a:endParaRPr lang="en-US" dirty="0"/>
           </a:p>
         </p:txBody>
@@ -5593,8 +7156,8 @@
         </p:nvSpPr>
         <p:spPr>
           <a:xfrm>
-            <a:off x="2666941" y="271790"/>
-            <a:ext cx="3661452" cy="523220"/>
+            <a:off x="2486157" y="271790"/>
+            <a:ext cx="4023024" cy="523220"/>
           </a:xfrm>
           <a:prstGeom prst="rect">
             <a:avLst/>
@@ -5609,13 +7172,71 @@
           <a:p>
             <a:pPr algn="ctr"/>
             <a:r>
+              <a:rPr lang="en-US" sz="2800" dirty="0" err="1" smtClean="0"/>
+              <a:t>Download,Update</a:t>
+            </a:r>
+            <a:r>
               <a:rPr lang="en-US" sz="2800" dirty="0" smtClean="0"/>
-              <a:t>Start, Stop and remove</a:t>
+              <a:t> remove</a:t>
             </a:r>
             <a:endParaRPr lang="en-US" sz="2800" dirty="0"/>
           </a:p>
         </p:txBody>
       </p:sp>
+      <p:pic>
+        <p:nvPicPr>
+          <p:cNvPr id="1026" name="Picture 2"/>
+          <p:cNvPicPr>
+            <a:picLocks noChangeAspect="1" noChangeArrowheads="1"/>
+          </p:cNvPicPr>
+          <p:nvPr/>
+        </p:nvPicPr>
+        <p:blipFill>
+          <a:blip r:embed="rId2">
+            <a:extLst>
+              <a:ext uri="{28A0092B-C50C-407E-A947-70E740481C1C}">
+                <a14:useLocalDpi xmlns:a14="http://schemas.microsoft.com/office/drawing/2010/main" val="0"/>
+              </a:ext>
+            </a:extLst>
+          </a:blip>
+          <a:srcRect/>
+          <a:stretch>
+            <a:fillRect/>
+          </a:stretch>
+        </p:blipFill>
+        <p:spPr bwMode="auto">
+          <a:xfrm>
+            <a:off x="262578" y="2542770"/>
+            <a:ext cx="8500421" cy="429030"/>
+          </a:xfrm>
+          <a:prstGeom prst="rect">
+            <a:avLst/>
+          </a:prstGeom>
+          <a:noFill/>
+          <a:ln>
+            <a:noFill/>
+          </a:ln>
+          <a:extLst>
+            <a:ext uri="{909E8E84-426E-40DD-AFC4-6F175D3DCCD1}">
+              <a14:hiddenFill xmlns:a14="http://schemas.microsoft.com/office/drawing/2010/main">
+                <a:solidFill>
+                  <a:schemeClr val="accent1"/>
+                </a:solidFill>
+              </a14:hiddenFill>
+            </a:ext>
+            <a:ext uri="{91240B29-F687-4F45-9708-019B960494DF}">
+              <a14:hiddenLine xmlns:a14="http://schemas.microsoft.com/office/drawing/2010/main" w="9525">
+                <a:solidFill>
+                  <a:schemeClr val="tx1"/>
+                </a:solidFill>
+                <a:miter lim="800000"/>
+                <a:headEnd/>
+                <a:tailEnd/>
+              </a14:hiddenLine>
+            </a:ext>
+          </a:extLst>
+        </p:spPr>
+      </p:pic>
     </p:spTree>
     <p:extLst>
       <p:ext uri="{BB962C8B-B14F-4D97-AF65-F5344CB8AC3E}">
@@ -5919,7 +7540,7 @@
           <p:spPr>
             <a:xfrm>
               <a:off x="990600" y="1972270"/>
-              <a:ext cx="2094035" cy="923330"/>
+              <a:ext cx="3760901" cy="1200329"/>
             </a:xfrm>
             <a:prstGeom prst="rect">
               <a:avLst/>
@@ -5940,7 +7561,11 @@
             <a:p>
               <a:r>
                 <a:rPr lang="en-US" dirty="0" smtClean="0"/>
-                <a:t>Docker0:172.16.0.1</a:t>
+                <a:t>Docker0:172.16.0.1 </a:t>
+              </a:r>
+              <a:r>
+                <a:rPr lang="en-US" b="1" dirty="0" smtClean="0"/>
+                <a:t>(Virtual Interface)</a:t>
               </a:r>
             </a:p>
             <a:p>
@@ -5960,7 +7585,21 @@
                 <a:rPr lang="en-US" dirty="0" smtClean="0"/>
                 <a:t>.</a:t>
               </a:r>
-              <a:endParaRPr lang="en-US" dirty="0"/>
+            </a:p>
+            <a:p>
+              <a:r>
+                <a:rPr lang="en-US" sz="1600" b="1" dirty="0" smtClean="0"/>
+                <a:t>(</a:t>
+              </a:r>
+              <a:r>
+                <a:rPr lang="en-US" sz="1600" b="1" dirty="0" err="1" smtClean="0"/>
+                <a:t>Vir.ethernetAdapter</a:t>
+              </a:r>
+              <a:r>
+                <a:rPr lang="en-US" sz="1600" b="1" dirty="0" smtClean="0"/>
+                <a:t>)</a:t>
+              </a:r>
+              <a:endParaRPr lang="en-US" sz="1600" b="1" dirty="0"/>
             </a:p>
           </p:txBody>
         </p:sp>

</xml_diff>